<commit_message>
Homepage design, new figures, banner, cosmetics
</commit_message>
<xml_diff>
--- a/website/static/images/loadingimage.pptx
+++ b/website/static/images/loadingimage.pptx
@@ -259,7 +259,7 @@
           <a:p>
             <a:fld id="{337014B8-5EAA-41C8-A34B-4574F0D75A27}" type="datetimeFigureOut">
               <a:rPr lang="cs-CZ" smtClean="0"/>
-              <a:t>30.09.2024</a:t>
+              <a:t>25.07.2025</a:t>
             </a:fld>
             <a:endParaRPr lang="cs-CZ"/>
           </a:p>
@@ -457,7 +457,7 @@
           <a:p>
             <a:fld id="{337014B8-5EAA-41C8-A34B-4574F0D75A27}" type="datetimeFigureOut">
               <a:rPr lang="cs-CZ" smtClean="0"/>
-              <a:t>30.09.2024</a:t>
+              <a:t>25.07.2025</a:t>
             </a:fld>
             <a:endParaRPr lang="cs-CZ"/>
           </a:p>
@@ -665,7 +665,7 @@
           <a:p>
             <a:fld id="{337014B8-5EAA-41C8-A34B-4574F0D75A27}" type="datetimeFigureOut">
               <a:rPr lang="cs-CZ" smtClean="0"/>
-              <a:t>30.09.2024</a:t>
+              <a:t>25.07.2025</a:t>
             </a:fld>
             <a:endParaRPr lang="cs-CZ"/>
           </a:p>
@@ -863,7 +863,7 @@
           <a:p>
             <a:fld id="{337014B8-5EAA-41C8-A34B-4574F0D75A27}" type="datetimeFigureOut">
               <a:rPr lang="cs-CZ" smtClean="0"/>
-              <a:t>30.09.2024</a:t>
+              <a:t>25.07.2025</a:t>
             </a:fld>
             <a:endParaRPr lang="cs-CZ"/>
           </a:p>
@@ -1138,7 +1138,7 @@
           <a:p>
             <a:fld id="{337014B8-5EAA-41C8-A34B-4574F0D75A27}" type="datetimeFigureOut">
               <a:rPr lang="cs-CZ" smtClean="0"/>
-              <a:t>30.09.2024</a:t>
+              <a:t>25.07.2025</a:t>
             </a:fld>
             <a:endParaRPr lang="cs-CZ"/>
           </a:p>
@@ -1403,7 +1403,7 @@
           <a:p>
             <a:fld id="{337014B8-5EAA-41C8-A34B-4574F0D75A27}" type="datetimeFigureOut">
               <a:rPr lang="cs-CZ" smtClean="0"/>
-              <a:t>30.09.2024</a:t>
+              <a:t>25.07.2025</a:t>
             </a:fld>
             <a:endParaRPr lang="cs-CZ"/>
           </a:p>
@@ -1815,7 +1815,7 @@
           <a:p>
             <a:fld id="{337014B8-5EAA-41C8-A34B-4574F0D75A27}" type="datetimeFigureOut">
               <a:rPr lang="cs-CZ" smtClean="0"/>
-              <a:t>30.09.2024</a:t>
+              <a:t>25.07.2025</a:t>
             </a:fld>
             <a:endParaRPr lang="cs-CZ"/>
           </a:p>
@@ -1956,7 +1956,7 @@
           <a:p>
             <a:fld id="{337014B8-5EAA-41C8-A34B-4574F0D75A27}" type="datetimeFigureOut">
               <a:rPr lang="cs-CZ" smtClean="0"/>
-              <a:t>30.09.2024</a:t>
+              <a:t>25.07.2025</a:t>
             </a:fld>
             <a:endParaRPr lang="cs-CZ"/>
           </a:p>
@@ -2069,7 +2069,7 @@
           <a:p>
             <a:fld id="{337014B8-5EAA-41C8-A34B-4574F0D75A27}" type="datetimeFigureOut">
               <a:rPr lang="cs-CZ" smtClean="0"/>
-              <a:t>30.09.2024</a:t>
+              <a:t>25.07.2025</a:t>
             </a:fld>
             <a:endParaRPr lang="cs-CZ"/>
           </a:p>
@@ -2380,7 +2380,7 @@
           <a:p>
             <a:fld id="{337014B8-5EAA-41C8-A34B-4574F0D75A27}" type="datetimeFigureOut">
               <a:rPr lang="cs-CZ" smtClean="0"/>
-              <a:t>30.09.2024</a:t>
+              <a:t>25.07.2025</a:t>
             </a:fld>
             <a:endParaRPr lang="cs-CZ"/>
           </a:p>
@@ -2668,7 +2668,7 @@
           <a:p>
             <a:fld id="{337014B8-5EAA-41C8-A34B-4574F0D75A27}" type="datetimeFigureOut">
               <a:rPr lang="cs-CZ" smtClean="0"/>
-              <a:t>30.09.2024</a:t>
+              <a:t>25.07.2025</a:t>
             </a:fld>
             <a:endParaRPr lang="cs-CZ"/>
           </a:p>
@@ -2909,7 +2909,7 @@
           <a:p>
             <a:fld id="{337014B8-5EAA-41C8-A34B-4574F0D75A27}" type="datetimeFigureOut">
               <a:rPr lang="cs-CZ" smtClean="0"/>
-              <a:t>30.09.2024</a:t>
+              <a:t>25.07.2025</a:t>
             </a:fld>
             <a:endParaRPr lang="cs-CZ"/>
           </a:p>
@@ -3328,6 +3328,60 @@
       </p:grpSpPr>
       <p:sp>
         <p:nvSpPr>
+          <p:cNvPr id="2" name="Obdélník 1">
+            <a:extLst>
+              <a:ext uri="{FF2B5EF4-FFF2-40B4-BE49-F238E27FC236}">
+                <a16:creationId xmlns:a16="http://schemas.microsoft.com/office/drawing/2014/main" id="{BD700A1F-B479-7077-BE9A-ED537B659265}"/>
+              </a:ext>
+            </a:extLst>
+          </p:cNvPr>
+          <p:cNvSpPr/>
+          <p:nvPr/>
+        </p:nvSpPr>
+        <p:spPr>
+          <a:xfrm>
+            <a:off x="0" y="0"/>
+            <a:ext cx="12192000" cy="6858000"/>
+          </a:xfrm>
+          <a:prstGeom prst="rect">
+            <a:avLst/>
+          </a:prstGeom>
+          <a:solidFill>
+            <a:schemeClr val="bg1"/>
+          </a:solidFill>
+          <a:ln>
+            <a:solidFill>
+              <a:schemeClr val="bg1"/>
+            </a:solidFill>
+          </a:ln>
+        </p:spPr>
+        <p:style>
+          <a:lnRef idx="2">
+            <a:schemeClr val="accent1">
+              <a:shade val="15000"/>
+            </a:schemeClr>
+          </a:lnRef>
+          <a:fillRef idx="1">
+            <a:schemeClr val="accent1"/>
+          </a:fillRef>
+          <a:effectRef idx="0">
+            <a:schemeClr val="accent1"/>
+          </a:effectRef>
+          <a:fontRef idx="minor">
+            <a:schemeClr val="lt1"/>
+          </a:fontRef>
+        </p:style>
+        <p:txBody>
+          <a:bodyPr rtlCol="0" anchor="ctr"/>
+          <a:lstStyle/>
+          <a:p>
+            <a:pPr algn="ctr"/>
+            <a:endParaRPr lang="cs-CZ"/>
+          </a:p>
+        </p:txBody>
+      </p:sp>
+      <p:sp>
+        <p:nvSpPr>
           <p:cNvPr id="18" name="Volný tvar: obrazec 17">
             <a:extLst>
               <a:ext uri="{FF2B5EF4-FFF2-40B4-BE49-F238E27FC236}">
@@ -6290,7 +6344,7 @@
             <a:pPr algn="ctr"/>
             <a:r>
               <a:rPr lang="en-US" sz="3600" b="1"/>
-              <a:t>This make take up to 60 seconds to complete. </a:t>
+              <a:t>This can take up to 60 seconds to complete. </a:t>
             </a:r>
           </a:p>
           <a:p>
@@ -6308,7 +6362,7 @@
             <a:pPr algn="ctr"/>
             <a:r>
               <a:rPr lang="en-US" sz="2800" b="1"/>
-              <a:t>In the unlikely event of data processing error, please check data integrity.</a:t>
+              <a:t>In the unlikely event of data processing error, please check integrity of your data.</a:t>
             </a:r>
           </a:p>
         </p:txBody>
@@ -6335,9 +6389,6 @@
                     <p:cTn id="3" fill="hold">
                       <p:stCondLst>
                         <p:cond delay="indefinite"/>
-                        <p:cond evt="onBegin" delay="0">
-                          <p:tn val="2"/>
-                        </p:cond>
                       </p:stCondLst>
                       <p:childTnLst>
                         <p:par>
@@ -6347,14 +6398,14 @@
                             </p:stCondLst>
                             <p:childTnLst>
                               <p:par>
-                                <p:cTn id="5" presetID="8" presetClass="emph" presetSubtype="0" fill="hold" grpId="0" nodeType="withEffect">
+                                <p:cTn id="5" presetID="8" presetClass="emph" presetSubtype="0" fill="hold" grpId="0" nodeType="clickEffect">
                                   <p:stCondLst>
                                     <p:cond delay="0"/>
                                   </p:stCondLst>
                                   <p:childTnLst>
-                                    <p:animRot by="43200000">
+                                    <p:animRot by="-21600000">
                                       <p:cBhvr>
-                                        <p:cTn id="6" dur="10000" fill="hold"/>
+                                        <p:cTn id="6" dur="5000" fill="hold"/>
                                         <p:tgtEl>
                                           <p:spTgt spid="18"/>
                                         </p:tgtEl>
@@ -6372,9 +6423,9 @@
                                     <p:cond delay="0"/>
                                   </p:stCondLst>
                                   <p:childTnLst>
-                                    <p:animRot by="-43200000">
+                                    <p:animRot by="21600000">
                                       <p:cBhvr>
-                                        <p:cTn id="8" dur="10000" fill="hold"/>
+                                        <p:cTn id="8" dur="5000" fill="hold"/>
                                         <p:tgtEl>
                                           <p:spTgt spid="19"/>
                                         </p:tgtEl>
@@ -6392,9 +6443,9 @@
                                     <p:cond delay="0"/>
                                   </p:stCondLst>
                                   <p:childTnLst>
-                                    <p:animRot by="-43200000">
+                                    <p:animRot by="21600000">
                                       <p:cBhvr>
-                                        <p:cTn id="10" dur="10000" fill="hold"/>
+                                        <p:cTn id="10" dur="5000" fill="hold"/>
                                         <p:tgtEl>
                                           <p:spTgt spid="20"/>
                                         </p:tgtEl>

</xml_diff>